<commit_message>
Added pros and cons in polymorphism
</commit_message>
<xml_diff>
--- a/4 - Polymorphism/Polymorphism (old).pptx
+++ b/4 - Polymorphism/Polymorphism (old).pptx
@@ -213,7 +213,7 @@
           <a:p>
             <a:fld id="{F666E1FD-E7A0-497B-BBC0-740BAAC97C64}" type="datetimeFigureOut">
               <a:rPr lang="en-PH" smtClean="0"/>
-              <a:t>05/02/2023</a:t>
+              <a:t>07/04/2025</a:t>
             </a:fld>
             <a:endParaRPr lang="en-PH"/>
           </a:p>
@@ -1386,7 +1386,7 @@
           <a:p>
             <a:fld id="{0CCF0B81-6BD8-4C65-9459-815598C5F1F4}" type="datetimeFigureOut">
               <a:rPr lang="en-PH" smtClean="0"/>
-              <a:t>05/02/2023</a:t>
+              <a:t>07/04/2025</a:t>
             </a:fld>
             <a:endParaRPr lang="en-PH"/>
           </a:p>
@@ -1586,7 +1586,7 @@
           <a:p>
             <a:fld id="{0CCF0B81-6BD8-4C65-9459-815598C5F1F4}" type="datetimeFigureOut">
               <a:rPr lang="en-PH" smtClean="0"/>
-              <a:t>05/02/2023</a:t>
+              <a:t>07/04/2025</a:t>
             </a:fld>
             <a:endParaRPr lang="en-PH"/>
           </a:p>
@@ -1796,7 +1796,7 @@
           <a:p>
             <a:fld id="{0CCF0B81-6BD8-4C65-9459-815598C5F1F4}" type="datetimeFigureOut">
               <a:rPr lang="en-PH" smtClean="0"/>
-              <a:t>05/02/2023</a:t>
+              <a:t>07/04/2025</a:t>
             </a:fld>
             <a:endParaRPr lang="en-PH"/>
           </a:p>
@@ -1996,7 +1996,7 @@
           <a:p>
             <a:fld id="{0CCF0B81-6BD8-4C65-9459-815598C5F1F4}" type="datetimeFigureOut">
               <a:rPr lang="en-PH" smtClean="0"/>
-              <a:t>05/02/2023</a:t>
+              <a:t>07/04/2025</a:t>
             </a:fld>
             <a:endParaRPr lang="en-PH"/>
           </a:p>
@@ -2272,7 +2272,7 @@
           <a:p>
             <a:fld id="{0CCF0B81-6BD8-4C65-9459-815598C5F1F4}" type="datetimeFigureOut">
               <a:rPr lang="en-PH" smtClean="0"/>
-              <a:t>05/02/2023</a:t>
+              <a:t>07/04/2025</a:t>
             </a:fld>
             <a:endParaRPr lang="en-PH"/>
           </a:p>
@@ -2540,7 +2540,7 @@
           <a:p>
             <a:fld id="{0CCF0B81-6BD8-4C65-9459-815598C5F1F4}" type="datetimeFigureOut">
               <a:rPr lang="en-PH" smtClean="0"/>
-              <a:t>05/02/2023</a:t>
+              <a:t>07/04/2025</a:t>
             </a:fld>
             <a:endParaRPr lang="en-PH"/>
           </a:p>
@@ -2955,7 +2955,7 @@
           <a:p>
             <a:fld id="{0CCF0B81-6BD8-4C65-9459-815598C5F1F4}" type="datetimeFigureOut">
               <a:rPr lang="en-PH" smtClean="0"/>
-              <a:t>05/02/2023</a:t>
+              <a:t>07/04/2025</a:t>
             </a:fld>
             <a:endParaRPr lang="en-PH"/>
           </a:p>
@@ -3097,7 +3097,7 @@
           <a:p>
             <a:fld id="{0CCF0B81-6BD8-4C65-9459-815598C5F1F4}" type="datetimeFigureOut">
               <a:rPr lang="en-PH" smtClean="0"/>
-              <a:t>05/02/2023</a:t>
+              <a:t>07/04/2025</a:t>
             </a:fld>
             <a:endParaRPr lang="en-PH"/>
           </a:p>
@@ -3210,7 +3210,7 @@
           <a:p>
             <a:fld id="{0CCF0B81-6BD8-4C65-9459-815598C5F1F4}" type="datetimeFigureOut">
               <a:rPr lang="en-PH" smtClean="0"/>
-              <a:t>05/02/2023</a:t>
+              <a:t>07/04/2025</a:t>
             </a:fld>
             <a:endParaRPr lang="en-PH"/>
           </a:p>
@@ -3523,7 +3523,7 @@
           <a:p>
             <a:fld id="{0CCF0B81-6BD8-4C65-9459-815598C5F1F4}" type="datetimeFigureOut">
               <a:rPr lang="en-PH" smtClean="0"/>
-              <a:t>05/02/2023</a:t>
+              <a:t>07/04/2025</a:t>
             </a:fld>
             <a:endParaRPr lang="en-PH"/>
           </a:p>
@@ -3812,7 +3812,7 @@
           <a:p>
             <a:fld id="{0CCF0B81-6BD8-4C65-9459-815598C5F1F4}" type="datetimeFigureOut">
               <a:rPr lang="en-PH" smtClean="0"/>
-              <a:t>05/02/2023</a:t>
+              <a:t>07/04/2025</a:t>
             </a:fld>
             <a:endParaRPr lang="en-PH"/>
           </a:p>
@@ -4055,7 +4055,7 @@
           <a:p>
             <a:fld id="{0CCF0B81-6BD8-4C65-9459-815598C5F1F4}" type="datetimeFigureOut">
               <a:rPr lang="en-PH" smtClean="0"/>
-              <a:t>05/02/2023</a:t>
+              <a:t>07/04/2025</a:t>
             </a:fld>
             <a:endParaRPr lang="en-PH"/>
           </a:p>
@@ -10718,7 +10718,7 @@
           <p:nvPr>
             <p:extLst>
               <p:ext uri="{D42A27DB-BD31-4B8C-83A1-F6EECF244321}">
-                <p14:modId xmlns:p14="http://schemas.microsoft.com/office/powerpoint/2010/main" val="315915240"/>
+                <p14:modId xmlns:p14="http://schemas.microsoft.com/office/powerpoint/2010/main" val="3304016998"/>
               </p:ext>
             </p:extLst>
           </p:nvPr>
@@ -10731,7 +10731,7 @@
           <a:graphicData uri="http://schemas.openxmlformats.org/drawingml/2006/table">
             <a:tbl>
               <a:tblPr firstRow="1" bandRow="1">
-                <a:tableStyleId>{5940675A-B579-460E-94D1-54222C63F5DA}</a:tableStyleId>
+                <a:tableStyleId>{7E9639D4-E3E2-4D34-9284-5A2195B3D0D7}</a:tableStyleId>
               </a:tblPr>
               <a:tblGrid>
                 <a:gridCol w="4064000">
@@ -10757,12 +10757,26 @@
                     <a:p>
                       <a:pPr algn="ctr"/>
                       <a:r>
-                        <a:rPr lang="en-PH" b="1" dirty="0"/>
+                        <a:rPr lang="en-PH" b="1" dirty="0">
+                          <a:solidFill>
+                            <a:srgbClr val="00B050"/>
+                          </a:solidFill>
+                        </a:rPr>
                         <a:t>Pros</a:t>
                       </a:r>
                     </a:p>
                   </a:txBody>
-                  <a:tcPr/>
+                  <a:tcPr>
+                    <a:lnB w="12700" cap="flat" cmpd="sng" algn="ctr">
+                      <a:solidFill>
+                        <a:schemeClr val="tx1"/>
+                      </a:solidFill>
+                      <a:prstDash val="solid"/>
+                      <a:round/>
+                      <a:headEnd type="none" w="med" len="med"/>
+                      <a:tailEnd type="none" w="med" len="med"/>
+                    </a:lnB>
+                  </a:tcPr>
                 </a:tc>
                 <a:tc>
                   <a:txBody>
@@ -10771,12 +10785,26 @@
                     <a:p>
                       <a:pPr algn="ctr"/>
                       <a:r>
-                        <a:rPr lang="en-PH" b="1" dirty="0"/>
+                        <a:rPr lang="en-PH" b="1" dirty="0">
+                          <a:solidFill>
+                            <a:srgbClr val="FF0000"/>
+                          </a:solidFill>
+                        </a:rPr>
                         <a:t>Cons</a:t>
                       </a:r>
                     </a:p>
                   </a:txBody>
-                  <a:tcPr/>
+                  <a:tcPr>
+                    <a:lnB w="12700" cap="flat" cmpd="sng" algn="ctr">
+                      <a:solidFill>
+                        <a:schemeClr val="tx1"/>
+                      </a:solidFill>
+                      <a:prstDash val="solid"/>
+                      <a:round/>
+                      <a:headEnd type="none" w="med" len="med"/>
+                      <a:tailEnd type="none" w="med" len="med"/>
+                    </a:lnB>
+                  </a:tcPr>
                 </a:tc>
                 <a:extLst>
                   <a:ext uri="{0D108BD9-81ED-4DB2-BD59-A6C34878D82A}">
@@ -10796,7 +10824,44 @@
                       </a:r>
                     </a:p>
                   </a:txBody>
-                  <a:tcPr/>
+                  <a:tcPr>
+                    <a:lnL w="12700" cap="flat" cmpd="sng" algn="ctr">
+                      <a:solidFill>
+                        <a:schemeClr val="tx1"/>
+                      </a:solidFill>
+                      <a:prstDash val="solid"/>
+                      <a:round/>
+                      <a:headEnd type="none" w="med" len="med"/>
+                      <a:tailEnd type="none" w="med" len="med"/>
+                    </a:lnL>
+                    <a:lnR w="12700" cap="flat" cmpd="sng" algn="ctr">
+                      <a:solidFill>
+                        <a:schemeClr val="tx1"/>
+                      </a:solidFill>
+                      <a:prstDash val="solid"/>
+                      <a:round/>
+                      <a:headEnd type="none" w="med" len="med"/>
+                      <a:tailEnd type="none" w="med" len="med"/>
+                    </a:lnR>
+                    <a:lnT w="12700" cap="flat" cmpd="sng" algn="ctr">
+                      <a:solidFill>
+                        <a:schemeClr val="tx1"/>
+                      </a:solidFill>
+                      <a:prstDash val="solid"/>
+                      <a:round/>
+                      <a:headEnd type="none" w="med" len="med"/>
+                      <a:tailEnd type="none" w="med" len="med"/>
+                    </a:lnT>
+                    <a:lnB w="12700" cap="flat" cmpd="sng" algn="ctr">
+                      <a:solidFill>
+                        <a:schemeClr val="tx1"/>
+                      </a:solidFill>
+                      <a:prstDash val="solid"/>
+                      <a:round/>
+                      <a:headEnd type="none" w="med" len="med"/>
+                      <a:tailEnd type="none" w="med" len="med"/>
+                    </a:lnB>
+                  </a:tcPr>
                 </a:tc>
                 <a:tc>
                   <a:txBody>
@@ -10821,15 +10886,7 @@
                         <a:defRPr/>
                       </a:pPr>
                       <a:r>
-                        <a:rPr lang="en-US" sz="1800" b="0" i="0" kern="1200" dirty="0">
-                          <a:solidFill>
-                            <a:schemeClr val="tx1"/>
-                          </a:solidFill>
-                          <a:effectLst/>
-                          <a:latin typeface="+mn-lt"/>
-                          <a:ea typeface="+mn-ea"/>
-                          <a:cs typeface="+mn-cs"/>
-                        </a:rPr>
+                        <a:rPr lang="en-US" dirty="0"/>
                         <a:t>It tends to reduce the readability of the code.</a:t>
                       </a:r>
                     </a:p>
@@ -10837,7 +10894,44 @@
                       <a:endParaRPr lang="en-PH" dirty="0"/>
                     </a:p>
                   </a:txBody>
-                  <a:tcPr/>
+                  <a:tcPr>
+                    <a:lnL w="12700" cap="flat" cmpd="sng" algn="ctr">
+                      <a:solidFill>
+                        <a:schemeClr val="tx1"/>
+                      </a:solidFill>
+                      <a:prstDash val="solid"/>
+                      <a:round/>
+                      <a:headEnd type="none" w="med" len="med"/>
+                      <a:tailEnd type="none" w="med" len="med"/>
+                    </a:lnL>
+                    <a:lnR w="12700" cap="flat" cmpd="sng" algn="ctr">
+                      <a:solidFill>
+                        <a:schemeClr val="tx1"/>
+                      </a:solidFill>
+                      <a:prstDash val="solid"/>
+                      <a:round/>
+                      <a:headEnd type="none" w="med" len="med"/>
+                      <a:tailEnd type="none" w="med" len="med"/>
+                    </a:lnR>
+                    <a:lnT w="12700" cap="flat" cmpd="sng" algn="ctr">
+                      <a:solidFill>
+                        <a:schemeClr val="tx1"/>
+                      </a:solidFill>
+                      <a:prstDash val="solid"/>
+                      <a:round/>
+                      <a:headEnd type="none" w="med" len="med"/>
+                      <a:tailEnd type="none" w="med" len="med"/>
+                    </a:lnT>
+                    <a:lnB w="12700" cap="flat" cmpd="sng" algn="ctr">
+                      <a:solidFill>
+                        <a:schemeClr val="tx1"/>
+                      </a:solidFill>
+                      <a:prstDash val="solid"/>
+                      <a:round/>
+                      <a:headEnd type="none" w="med" len="med"/>
+                      <a:tailEnd type="none" w="med" len="med"/>
+                    </a:lnB>
+                  </a:tcPr>
                 </a:tc>
                 <a:extLst>
                   <a:ext uri="{0D108BD9-81ED-4DB2-BD59-A6C34878D82A}">
@@ -10857,7 +10951,44 @@
                       </a:r>
                     </a:p>
                   </a:txBody>
-                  <a:tcPr/>
+                  <a:tcPr>
+                    <a:lnL w="12700" cap="flat" cmpd="sng" algn="ctr">
+                      <a:solidFill>
+                        <a:schemeClr val="tx1"/>
+                      </a:solidFill>
+                      <a:prstDash val="solid"/>
+                      <a:round/>
+                      <a:headEnd type="none" w="med" len="med"/>
+                      <a:tailEnd type="none" w="med" len="med"/>
+                    </a:lnL>
+                    <a:lnR w="12700" cap="flat" cmpd="sng" algn="ctr">
+                      <a:solidFill>
+                        <a:schemeClr val="tx1"/>
+                      </a:solidFill>
+                      <a:prstDash val="solid"/>
+                      <a:round/>
+                      <a:headEnd type="none" w="med" len="med"/>
+                      <a:tailEnd type="none" w="med" len="med"/>
+                    </a:lnR>
+                    <a:lnT w="12700" cap="flat" cmpd="sng" algn="ctr">
+                      <a:solidFill>
+                        <a:schemeClr val="tx1"/>
+                      </a:solidFill>
+                      <a:prstDash val="solid"/>
+                      <a:round/>
+                      <a:headEnd type="none" w="med" len="med"/>
+                      <a:tailEnd type="none" w="med" len="med"/>
+                    </a:lnT>
+                    <a:lnB w="12700" cap="flat" cmpd="sng" algn="ctr">
+                      <a:solidFill>
+                        <a:schemeClr val="tx1"/>
+                      </a:solidFill>
+                      <a:prstDash val="solid"/>
+                      <a:round/>
+                      <a:headEnd type="none" w="med" len="med"/>
+                      <a:tailEnd type="none" w="med" len="med"/>
+                    </a:lnB>
+                  </a:tcPr>
                 </a:tc>
                 <a:tc>
                   <a:txBody>
@@ -10870,7 +11001,44 @@
                       </a:r>
                     </a:p>
                   </a:txBody>
-                  <a:tcPr/>
+                  <a:tcPr>
+                    <a:lnL w="12700" cap="flat" cmpd="sng" algn="ctr">
+                      <a:solidFill>
+                        <a:schemeClr val="tx1"/>
+                      </a:solidFill>
+                      <a:prstDash val="solid"/>
+                      <a:round/>
+                      <a:headEnd type="none" w="med" len="med"/>
+                      <a:tailEnd type="none" w="med" len="med"/>
+                    </a:lnL>
+                    <a:lnR w="12700" cap="flat" cmpd="sng" algn="ctr">
+                      <a:solidFill>
+                        <a:schemeClr val="tx1"/>
+                      </a:solidFill>
+                      <a:prstDash val="solid"/>
+                      <a:round/>
+                      <a:headEnd type="none" w="med" len="med"/>
+                      <a:tailEnd type="none" w="med" len="med"/>
+                    </a:lnR>
+                    <a:lnT w="12700" cap="flat" cmpd="sng" algn="ctr">
+                      <a:solidFill>
+                        <a:schemeClr val="tx1"/>
+                      </a:solidFill>
+                      <a:prstDash val="solid"/>
+                      <a:round/>
+                      <a:headEnd type="none" w="med" len="med"/>
+                      <a:tailEnd type="none" w="med" len="med"/>
+                    </a:lnT>
+                    <a:lnB w="12700" cap="flat" cmpd="sng" algn="ctr">
+                      <a:solidFill>
+                        <a:schemeClr val="tx1"/>
+                      </a:solidFill>
+                      <a:prstDash val="solid"/>
+                      <a:round/>
+                      <a:headEnd type="none" w="med" len="med"/>
+                      <a:tailEnd type="none" w="med" len="med"/>
+                    </a:lnB>
+                  </a:tcPr>
                 </a:tc>
                 <a:extLst>
                   <a:ext uri="{0D108BD9-81ED-4DB2-BD59-A6C34878D82A}">

</xml_diff>